<commit_message>
added grouping to boxplot visual
</commit_message>
<xml_diff>
--- a/presentation /python_project_presentation2.pptx
+++ b/presentation /python_project_presentation2.pptx
@@ -111,6 +111,11 @@
       </a:defRPr>
     </a:lvl9pPr>
   </p:defaultTextStyle>
+  <p:extLst>
+    <p:ext uri="{EFAFB233-063F-42B5-8137-9DF3F51BA10A}">
+      <p15:sldGuideLst xmlns:p15="http://schemas.microsoft.com/office/powerpoint/2012/main"/>
+    </p:ext>
+  </p:extLst>
 </p:presentation>
 </file>
 
@@ -196,7 +201,7 @@
           <a:p>
             <a:fld id="{73B8CE4D-4D3C-CD46-B1FC-6E87F78CB9F9}" type="datetimeFigureOut">
               <a:rPr lang="en-US" smtClean="0"/>
-              <a:t>12/17/22</a:t>
+              <a:t>12/19/22</a:t>
             </a:fld>
             <a:endParaRPr lang="en-US"/>
           </a:p>
@@ -1032,7 +1037,7 @@
           <a:p>
             <a:fld id="{E2B9C846-848C-9943-8752-5A788A87F4E2}" type="datetimeFigureOut">
               <a:rPr lang="en-US" smtClean="0"/>
-              <a:t>12/17/22</a:t>
+              <a:t>12/19/22</a:t>
             </a:fld>
             <a:endParaRPr lang="en-US"/>
           </a:p>
@@ -1230,7 +1235,7 @@
           <a:p>
             <a:fld id="{E2B9C846-848C-9943-8752-5A788A87F4E2}" type="datetimeFigureOut">
               <a:rPr lang="en-US" smtClean="0"/>
-              <a:t>12/17/22</a:t>
+              <a:t>12/19/22</a:t>
             </a:fld>
             <a:endParaRPr lang="en-US"/>
           </a:p>
@@ -1438,7 +1443,7 @@
           <a:p>
             <a:fld id="{E2B9C846-848C-9943-8752-5A788A87F4E2}" type="datetimeFigureOut">
               <a:rPr lang="en-US" smtClean="0"/>
-              <a:t>12/17/22</a:t>
+              <a:t>12/19/22</a:t>
             </a:fld>
             <a:endParaRPr lang="en-US"/>
           </a:p>
@@ -1636,7 +1641,7 @@
           <a:p>
             <a:fld id="{E2B9C846-848C-9943-8752-5A788A87F4E2}" type="datetimeFigureOut">
               <a:rPr lang="en-US" smtClean="0"/>
-              <a:t>12/17/22</a:t>
+              <a:t>12/19/22</a:t>
             </a:fld>
             <a:endParaRPr lang="en-US"/>
           </a:p>
@@ -1911,7 +1916,7 @@
           <a:p>
             <a:fld id="{E2B9C846-848C-9943-8752-5A788A87F4E2}" type="datetimeFigureOut">
               <a:rPr lang="en-US" smtClean="0"/>
-              <a:t>12/17/22</a:t>
+              <a:t>12/19/22</a:t>
             </a:fld>
             <a:endParaRPr lang="en-US"/>
           </a:p>
@@ -2176,7 +2181,7 @@
           <a:p>
             <a:fld id="{E2B9C846-848C-9943-8752-5A788A87F4E2}" type="datetimeFigureOut">
               <a:rPr lang="en-US" smtClean="0"/>
-              <a:t>12/17/22</a:t>
+              <a:t>12/19/22</a:t>
             </a:fld>
             <a:endParaRPr lang="en-US"/>
           </a:p>
@@ -2588,7 +2593,7 @@
           <a:p>
             <a:fld id="{E2B9C846-848C-9943-8752-5A788A87F4E2}" type="datetimeFigureOut">
               <a:rPr lang="en-US" smtClean="0"/>
-              <a:t>12/17/22</a:t>
+              <a:t>12/19/22</a:t>
             </a:fld>
             <a:endParaRPr lang="en-US"/>
           </a:p>
@@ -2729,7 +2734,7 @@
           <a:p>
             <a:fld id="{E2B9C846-848C-9943-8752-5A788A87F4E2}" type="datetimeFigureOut">
               <a:rPr lang="en-US" smtClean="0"/>
-              <a:t>12/17/22</a:t>
+              <a:t>12/19/22</a:t>
             </a:fld>
             <a:endParaRPr lang="en-US"/>
           </a:p>
@@ -2842,7 +2847,7 @@
           <a:p>
             <a:fld id="{E2B9C846-848C-9943-8752-5A788A87F4E2}" type="datetimeFigureOut">
               <a:rPr lang="en-US" smtClean="0"/>
-              <a:t>12/17/22</a:t>
+              <a:t>12/19/22</a:t>
             </a:fld>
             <a:endParaRPr lang="en-US"/>
           </a:p>
@@ -3153,7 +3158,7 @@
           <a:p>
             <a:fld id="{E2B9C846-848C-9943-8752-5A788A87F4E2}" type="datetimeFigureOut">
               <a:rPr lang="en-US" smtClean="0"/>
-              <a:t>12/17/22</a:t>
+              <a:t>12/19/22</a:t>
             </a:fld>
             <a:endParaRPr lang="en-US"/>
           </a:p>
@@ -3441,7 +3446,7 @@
           <a:p>
             <a:fld id="{E2B9C846-848C-9943-8752-5A788A87F4E2}" type="datetimeFigureOut">
               <a:rPr lang="en-US" smtClean="0"/>
-              <a:t>12/17/22</a:t>
+              <a:t>12/19/22</a:t>
             </a:fld>
             <a:endParaRPr lang="en-US"/>
           </a:p>
@@ -3682,7 +3687,7 @@
           <a:p>
             <a:fld id="{E2B9C846-848C-9943-8752-5A788A87F4E2}" type="datetimeFigureOut">
               <a:rPr lang="en-US" smtClean="0"/>
-              <a:t>12/17/22</a:t>
+              <a:t>12/19/22</a:t>
             </a:fld>
             <a:endParaRPr lang="en-US"/>
           </a:p>
@@ -4252,8 +4257,8 @@
         </p:nvSpPr>
         <p:spPr>
           <a:xfrm>
-            <a:off x="3048712" y="3107971"/>
-            <a:ext cx="6097424" cy="2585323"/>
+            <a:off x="2820112" y="1382041"/>
+            <a:ext cx="6097424" cy="2862322"/>
           </a:xfrm>
           <a:prstGeom prst="rect">
             <a:avLst/>
@@ -4281,12 +4286,22 @@
             </a:r>
           </a:p>
           <a:p>
+            <a:r>
+              <a:rPr lang="en-US" dirty="0"/>
+              <a:t>Myth#2: Temperature affects electric efficiency </a:t>
+            </a:r>
+          </a:p>
+          <a:p>
             <a:endParaRPr lang="en-US" dirty="0"/>
           </a:p>
           <a:p>
             <a:r>
+              <a:rPr lang="en-US" strike="sngStrike" dirty="0"/>
+              <a:t>Myth #3: There is nowhere to charge. </a:t>
+            </a:r>
+            <a:r>
               <a:rPr lang="en-US" dirty="0"/>
-              <a:t>Myth #3: There is nowhere to charge.</a:t>
+              <a:t>To much of a tangent</a:t>
             </a:r>
           </a:p>
           <a:p>

</xml_diff>